<commit_message>
update PPT about sources
</commit_message>
<xml_diff>
--- a/docs/OSM/Examples.pptx
+++ b/docs/OSM/Examples.pptx
@@ -10,6 +10,7 @@
     <p:sldId id="259" r:id="rId4"/>
     <p:sldId id="260" r:id="rId5"/>
     <p:sldId id="257" r:id="rId6"/>
+    <p:sldId id="261" r:id="rId7"/>
   </p:sldIdLst>
   <p:sldSz cx="12192000" cy="6858000"/>
   <p:notesSz cx="6858000" cy="9144000"/>
@@ -130,6 +131,7 @@
         <p14:section name="review" id="{857ED55A-5D63-E945-9A8C-1A5438AE9D5F}">
           <p14:sldIdLst>
             <p14:sldId id="257"/>
+            <p14:sldId id="261"/>
           </p14:sldIdLst>
         </p14:section>
       </p14:sectionLst>
@@ -3769,6 +3771,426 @@
 </p:sld>
 </file>
 
+<file path=ppt/slides/slide6.xml><?xml version="1.0" encoding="utf-8"?>
+<p:sld xmlns:a="http://schemas.openxmlformats.org/drawingml/2006/main" xmlns:r="http://schemas.openxmlformats.org/officeDocument/2006/relationships" xmlns:p="http://schemas.openxmlformats.org/presentationml/2006/main">
+  <p:cSld>
+    <p:bg>
+      <p:bgPr>
+        <a:solidFill>
+          <a:schemeClr val="bg1">
+            <a:tint val="95000"/>
+            <a:satMod val="170000"/>
+          </a:schemeClr>
+        </a:solidFill>
+        <a:effectLst/>
+      </p:bgPr>
+    </p:bg>
+    <p:spTree>
+      <p:nvGrpSpPr>
+        <p:cNvPr id="1" name=""/>
+        <p:cNvGrpSpPr/>
+        <p:nvPr/>
+      </p:nvGrpSpPr>
+      <p:grpSpPr>
+        <a:xfrm>
+          <a:off x="0" y="0"/>
+          <a:ext cx="0" cy="0"/>
+          <a:chOff x="0" y="0"/>
+          <a:chExt cx="0" cy="0"/>
+        </a:xfrm>
+      </p:grpSpPr>
+      <p:pic>
+        <p:nvPicPr>
+          <p:cNvPr id="4" name="Picture 3">
+            <a:extLst>
+              <a:ext uri="{FF2B5EF4-FFF2-40B4-BE49-F238E27FC236}">
+                <a16:creationId xmlns:a16="http://schemas.microsoft.com/office/drawing/2014/main" id="{E539402D-09C2-8744-A2B4-837E592EC872}"/>
+              </a:ext>
+            </a:extLst>
+          </p:cNvPr>
+          <p:cNvPicPr>
+            <a:picLocks noChangeAspect="1"/>
+          </p:cNvPicPr>
+          <p:nvPr/>
+        </p:nvPicPr>
+        <p:blipFill rotWithShape="1">
+          <a:blip r:embed="rId2"/>
+          <a:srcRect l="4429" r="1" b="1"/>
+          <a:stretch/>
+        </p:blipFill>
+        <p:spPr>
+          <a:xfrm>
+            <a:off x="20" y="10"/>
+            <a:ext cx="7009876" cy="6857990"/>
+          </a:xfrm>
+          <a:custGeom>
+            <a:avLst/>
+            <a:gdLst/>
+            <a:ahLst/>
+            <a:cxnLst/>
+            <a:rect l="l" t="t" r="r" b="b"/>
+            <a:pathLst>
+              <a:path w="7009896" h="6858000">
+                <a:moveTo>
+                  <a:pt x="0" y="0"/>
+                </a:moveTo>
+                <a:lnTo>
+                  <a:pt x="7009896" y="0"/>
+                </a:lnTo>
+                <a:lnTo>
+                  <a:pt x="7009896" y="1"/>
+                </a:lnTo>
+                <a:lnTo>
+                  <a:pt x="6295211" y="1"/>
+                </a:lnTo>
+                <a:lnTo>
+                  <a:pt x="6195255" y="380651"/>
+                </a:lnTo>
+                <a:cubicBezTo>
+                  <a:pt x="5677600" y="2559611"/>
+                  <a:pt x="5966601" y="4758249"/>
+                  <a:pt x="6880029" y="6647018"/>
+                </a:cubicBezTo>
+                <a:lnTo>
+                  <a:pt x="6988280" y="6858000"/>
+                </a:lnTo>
+                <a:lnTo>
+                  <a:pt x="0" y="6858000"/>
+                </a:lnTo>
+                <a:close/>
+              </a:path>
+            </a:pathLst>
+          </a:custGeom>
+        </p:spPr>
+      </p:pic>
+      <p:sp>
+        <p:nvSpPr>
+          <p:cNvPr id="20" name="Freeform: Shape 19">
+            <a:extLst>
+              <a:ext uri="{FF2B5EF4-FFF2-40B4-BE49-F238E27FC236}">
+                <a16:creationId xmlns:a16="http://schemas.microsoft.com/office/drawing/2014/main" id="{5FDF4720-5445-47BE-89FE-E40D1AE6F619}"/>
+              </a:ext>
+              <a:ext uri="{C183D7F6-B498-43B3-948B-1728B52AA6E4}">
+                <adec:decorative xmlns:adec="http://schemas.microsoft.com/office/drawing/2017/decorative" val="1"/>
+              </a:ext>
+            </a:extLst>
+          </p:cNvPr>
+          <p:cNvSpPr>
+            <a:spLocks noGrp="1" noRot="1" noChangeAspect="1" noMove="1" noResize="1" noEditPoints="1" noAdjustHandles="1" noChangeArrowheads="1" noChangeShapeType="1" noTextEdit="1"/>
+          </p:cNvSpPr>
+          <p:nvPr>
+            <p:extLst>
+              <p:ext uri="{386F3935-93C4-4BCD-93E2-E3B085C9AB24}">
+                <p16:designElem xmlns:p16="http://schemas.microsoft.com/office/powerpoint/2015/main" val="1"/>
+              </p:ext>
+            </p:extLst>
+          </p:nvPr>
+        </p:nvSpPr>
+        <p:spPr>
+          <a:xfrm flipH="1">
+            <a:off x="5711927" y="-1"/>
+            <a:ext cx="6480073" cy="6858002"/>
+          </a:xfrm>
+          <a:custGeom>
+            <a:avLst/>
+            <a:gdLst>
+              <a:gd name="connsiteX0" fmla="*/ 6130244 w 6480073"/>
+              <a:gd name="connsiteY0" fmla="*/ 0 h 6858002"/>
+              <a:gd name="connsiteX1" fmla="*/ 6212951 w 6480073"/>
+              <a:gd name="connsiteY1" fmla="*/ 314584 h 6858002"/>
+              <a:gd name="connsiteX2" fmla="*/ 5540779 w 6480073"/>
+              <a:gd name="connsiteY2" fmla="*/ 6756649 h 6858002"/>
+              <a:gd name="connsiteX3" fmla="*/ 5489971 w 6480073"/>
+              <a:gd name="connsiteY3" fmla="*/ 6858002 h 6858002"/>
+              <a:gd name="connsiteX4" fmla="*/ 0 w 6480073"/>
+              <a:gd name="connsiteY4" fmla="*/ 6858002 h 6858002"/>
+              <a:gd name="connsiteX5" fmla="*/ 0 w 6480073"/>
+              <a:gd name="connsiteY5" fmla="*/ 0 h 6858002"/>
+            </a:gdLst>
+            <a:ahLst/>
+            <a:cxnLst>
+              <a:cxn ang="0">
+                <a:pos x="connsiteX0" y="connsiteY0"/>
+              </a:cxn>
+              <a:cxn ang="0">
+                <a:pos x="connsiteX1" y="connsiteY1"/>
+              </a:cxn>
+              <a:cxn ang="0">
+                <a:pos x="connsiteX2" y="connsiteY2"/>
+              </a:cxn>
+              <a:cxn ang="0">
+                <a:pos x="connsiteX3" y="connsiteY3"/>
+              </a:cxn>
+              <a:cxn ang="0">
+                <a:pos x="connsiteX4" y="connsiteY4"/>
+              </a:cxn>
+              <a:cxn ang="0">
+                <a:pos x="connsiteX5" y="connsiteY5"/>
+              </a:cxn>
+            </a:cxnLst>
+            <a:rect l="l" t="t" r="r" b="b"/>
+            <a:pathLst>
+              <a:path w="6480073" h="6858002">
+                <a:moveTo>
+                  <a:pt x="6130244" y="0"/>
+                </a:moveTo>
+                <a:lnTo>
+                  <a:pt x="6212951" y="314584"/>
+                </a:lnTo>
+                <a:cubicBezTo>
+                  <a:pt x="6745828" y="2551616"/>
+                  <a:pt x="6460994" y="4808873"/>
+                  <a:pt x="5540779" y="6756649"/>
+                </a:cubicBezTo>
+                <a:lnTo>
+                  <a:pt x="5489971" y="6858002"/>
+                </a:lnTo>
+                <a:lnTo>
+                  <a:pt x="0" y="6858002"/>
+                </a:lnTo>
+                <a:lnTo>
+                  <a:pt x="0" y="0"/>
+                </a:lnTo>
+                <a:close/>
+              </a:path>
+            </a:pathLst>
+          </a:custGeom>
+          <a:solidFill>
+            <a:schemeClr val="tx1">
+              <a:alpha val="80000"/>
+            </a:schemeClr>
+          </a:solidFill>
+          <a:ln>
+            <a:noFill/>
+          </a:ln>
+        </p:spPr>
+        <p:style>
+          <a:lnRef idx="2">
+            <a:schemeClr val="accent1">
+              <a:shade val="50000"/>
+            </a:schemeClr>
+          </a:lnRef>
+          <a:fillRef idx="1">
+            <a:schemeClr val="accent1"/>
+          </a:fillRef>
+          <a:effectRef idx="0">
+            <a:schemeClr val="accent1"/>
+          </a:effectRef>
+          <a:fontRef idx="minor">
+            <a:schemeClr val="lt1"/>
+          </a:fontRef>
+        </p:style>
+        <p:txBody>
+          <a:bodyPr wrap="square" rtlCol="0" anchor="ctr">
+            <a:noAutofit/>
+          </a:bodyPr>
+          <a:lstStyle/>
+          <a:p>
+            <a:pPr algn="ctr"/>
+            <a:endParaRPr lang="en-US"/>
+          </a:p>
+        </p:txBody>
+      </p:sp>
+      <p:sp useBgFill="1">
+        <p:nvSpPr>
+          <p:cNvPr id="29" name="Freeform: Shape 21">
+            <a:extLst>
+              <a:ext uri="{FF2B5EF4-FFF2-40B4-BE49-F238E27FC236}">
+                <a16:creationId xmlns:a16="http://schemas.microsoft.com/office/drawing/2014/main" id="{AC8710B4-A815-4082-9E4F-F13A0007090C}"/>
+              </a:ext>
+              <a:ext uri="{C183D7F6-B498-43B3-948B-1728B52AA6E4}">
+                <adec:decorative xmlns:adec="http://schemas.microsoft.com/office/drawing/2017/decorative" val="1"/>
+              </a:ext>
+            </a:extLst>
+          </p:cNvPr>
+          <p:cNvSpPr>
+            <a:spLocks noGrp="1" noRot="1" noChangeAspect="1" noMove="1" noResize="1" noEditPoints="1" noAdjustHandles="1" noChangeArrowheads="1" noChangeShapeType="1" noTextEdit="1"/>
+          </p:cNvSpPr>
+          <p:nvPr>
+            <p:extLst>
+              <p:ext uri="{386F3935-93C4-4BCD-93E2-E3B085C9AB24}">
+                <p16:designElem xmlns:p16="http://schemas.microsoft.com/office/powerpoint/2015/main" val="1"/>
+              </p:ext>
+            </p:extLst>
+          </p:nvPr>
+        </p:nvSpPr>
+        <p:spPr>
+          <a:xfrm flipH="1">
+            <a:off x="5942784" y="0"/>
+            <a:ext cx="6249216" cy="6858001"/>
+          </a:xfrm>
+          <a:custGeom>
+            <a:avLst/>
+            <a:gdLst>
+              <a:gd name="connsiteX0" fmla="*/ 0 w 6249216"/>
+              <a:gd name="connsiteY0" fmla="*/ 0 h 6858001"/>
+              <a:gd name="connsiteX1" fmla="*/ 5893742 w 6249216"/>
+              <a:gd name="connsiteY1" fmla="*/ 1 h 6858001"/>
+              <a:gd name="connsiteX2" fmla="*/ 5993697 w 6249216"/>
+              <a:gd name="connsiteY2" fmla="*/ 380651 h 6858001"/>
+              <a:gd name="connsiteX3" fmla="*/ 5308924 w 6249216"/>
+              <a:gd name="connsiteY3" fmla="*/ 6647018 h 6858001"/>
+              <a:gd name="connsiteX4" fmla="*/ 5200672 w 6249216"/>
+              <a:gd name="connsiteY4" fmla="*/ 6858001 h 6858001"/>
+              <a:gd name="connsiteX5" fmla="*/ 1 w 6249216"/>
+              <a:gd name="connsiteY5" fmla="*/ 6858001 h 6858001"/>
+            </a:gdLst>
+            <a:ahLst/>
+            <a:cxnLst>
+              <a:cxn ang="0">
+                <a:pos x="connsiteX0" y="connsiteY0"/>
+              </a:cxn>
+              <a:cxn ang="0">
+                <a:pos x="connsiteX1" y="connsiteY1"/>
+              </a:cxn>
+              <a:cxn ang="0">
+                <a:pos x="connsiteX2" y="connsiteY2"/>
+              </a:cxn>
+              <a:cxn ang="0">
+                <a:pos x="connsiteX3" y="connsiteY3"/>
+              </a:cxn>
+              <a:cxn ang="0">
+                <a:pos x="connsiteX4" y="connsiteY4"/>
+              </a:cxn>
+              <a:cxn ang="0">
+                <a:pos x="connsiteX5" y="connsiteY5"/>
+              </a:cxn>
+            </a:cxnLst>
+            <a:rect l="l" t="t" r="r" b="b"/>
+            <a:pathLst>
+              <a:path w="6249216" h="6858001">
+                <a:moveTo>
+                  <a:pt x="0" y="0"/>
+                </a:moveTo>
+                <a:lnTo>
+                  <a:pt x="5893742" y="1"/>
+                </a:lnTo>
+                <a:lnTo>
+                  <a:pt x="5993697" y="380651"/>
+                </a:lnTo>
+                <a:cubicBezTo>
+                  <a:pt x="6511353" y="2559611"/>
+                  <a:pt x="6222352" y="4758249"/>
+                  <a:pt x="5308924" y="6647018"/>
+                </a:cubicBezTo>
+                <a:lnTo>
+                  <a:pt x="5200672" y="6858001"/>
+                </a:lnTo>
+                <a:lnTo>
+                  <a:pt x="1" y="6858001"/>
+                </a:lnTo>
+                <a:close/>
+              </a:path>
+            </a:pathLst>
+          </a:custGeom>
+          <a:ln>
+            <a:noFill/>
+          </a:ln>
+        </p:spPr>
+        <p:style>
+          <a:lnRef idx="2">
+            <a:schemeClr val="accent1">
+              <a:shade val="50000"/>
+            </a:schemeClr>
+          </a:lnRef>
+          <a:fillRef idx="1">
+            <a:schemeClr val="accent1"/>
+          </a:fillRef>
+          <a:effectRef idx="0">
+            <a:schemeClr val="accent1"/>
+          </a:effectRef>
+          <a:fontRef idx="minor">
+            <a:schemeClr val="lt1"/>
+          </a:fontRef>
+        </p:style>
+        <p:txBody>
+          <a:bodyPr wrap="square" rtlCol="0" anchor="ctr">
+            <a:noAutofit/>
+          </a:bodyPr>
+          <a:lstStyle/>
+          <a:p>
+            <a:pPr algn="ctr"/>
+            <a:endParaRPr lang="en-US"/>
+          </a:p>
+        </p:txBody>
+      </p:sp>
+      <p:sp>
+        <p:nvSpPr>
+          <p:cNvPr id="2" name="Title 1">
+            <a:extLst>
+              <a:ext uri="{FF2B5EF4-FFF2-40B4-BE49-F238E27FC236}">
+                <a16:creationId xmlns:a16="http://schemas.microsoft.com/office/drawing/2014/main" id="{7DF748C2-04D5-4B4D-AA64-0AC8011B1616}"/>
+              </a:ext>
+            </a:extLst>
+          </p:cNvPr>
+          <p:cNvSpPr>
+            <a:spLocks noGrp="1"/>
+          </p:cNvSpPr>
+          <p:nvPr>
+            <p:ph type="title"/>
+          </p:nvPr>
+        </p:nvSpPr>
+        <p:spPr>
+          <a:xfrm>
+            <a:off x="6801436" y="1396289"/>
+            <a:ext cx="4819952" cy="1325563"/>
+          </a:xfrm>
+        </p:spPr>
+        <p:txBody>
+          <a:bodyPr>
+            <a:normAutofit/>
+          </a:bodyPr>
+          <a:lstStyle/>
+          <a:p>
+            <a:endParaRPr lang="en-GB"/>
+          </a:p>
+        </p:txBody>
+      </p:sp>
+      <p:sp>
+        <p:nvSpPr>
+          <p:cNvPr id="30" name="Content Placeholder 2">
+            <a:extLst>
+              <a:ext uri="{FF2B5EF4-FFF2-40B4-BE49-F238E27FC236}">
+                <a16:creationId xmlns:a16="http://schemas.microsoft.com/office/drawing/2014/main" id="{7A33D0C6-3193-874C-B08B-CEF4A064DF52}"/>
+              </a:ext>
+            </a:extLst>
+          </p:cNvPr>
+          <p:cNvSpPr>
+            <a:spLocks noGrp="1"/>
+          </p:cNvSpPr>
+          <p:nvPr>
+            <p:ph idx="1"/>
+          </p:nvPr>
+        </p:nvSpPr>
+        <p:spPr>
+          <a:xfrm>
+            <a:off x="6801435" y="2871982"/>
+            <a:ext cx="4819951" cy="3181684"/>
+          </a:xfrm>
+        </p:spPr>
+        <p:txBody>
+          <a:bodyPr anchor="t">
+            <a:normAutofit/>
+          </a:bodyPr>
+          <a:lstStyle/>
+          <a:p>
+            <a:endParaRPr lang="en-GB" sz="1800"/>
+          </a:p>
+        </p:txBody>
+      </p:sp>
+    </p:spTree>
+    <p:extLst>
+      <p:ext uri="{BB962C8B-B14F-4D97-AF65-F5344CB8AC3E}">
+        <p14:creationId xmlns:p14="http://schemas.microsoft.com/office/powerpoint/2010/main" val="137940193"/>
+      </p:ext>
+    </p:extLst>
+  </p:cSld>
+  <p:clrMapOvr>
+    <a:overrideClrMapping bg1="dk1" tx1="lt1" bg2="dk2" tx2="lt2" accent1="accent1" accent2="accent2" accent3="accent3" accent4="accent4" accent5="accent5" accent6="accent6" hlink="hlink" folHlink="folHlink"/>
+  </p:clrMapOvr>
+</p:sld>
+</file>
+
 <file path=ppt/theme/theme1.xml><?xml version="1.0" encoding="utf-8"?>
 <a:theme xmlns:a="http://schemas.openxmlformats.org/drawingml/2006/main" name="Office Theme">
   <a:themeElements>

</xml_diff>